<commit_message>
Updated new file (noHeader-Master_fullname)
</commit_message>
<xml_diff>
--- a/Folder_structure.pptx
+++ b/Folder_structure.pptx
@@ -289,7 +289,7 @@
           <a:p>
             <a:fld id="{E9EBA66C-AAA3-4D08-8AFA-634FFF9E633D}" type="datetimeFigureOut">
               <a:rPr lang="en-CA" smtClean="0"/>
-              <a:t>17/02/2016</a:t>
+              <a:t>18/02/2016</a:t>
             </a:fld>
             <a:endParaRPr lang="en-CA"/>
           </a:p>
@@ -459,7 +459,7 @@
           <a:p>
             <a:fld id="{E9EBA66C-AAA3-4D08-8AFA-634FFF9E633D}" type="datetimeFigureOut">
               <a:rPr lang="en-CA" smtClean="0"/>
-              <a:t>17/02/2016</a:t>
+              <a:t>18/02/2016</a:t>
             </a:fld>
             <a:endParaRPr lang="en-CA"/>
           </a:p>
@@ -639,7 +639,7 @@
           <a:p>
             <a:fld id="{E9EBA66C-AAA3-4D08-8AFA-634FFF9E633D}" type="datetimeFigureOut">
               <a:rPr lang="en-CA" smtClean="0"/>
-              <a:t>17/02/2016</a:t>
+              <a:t>18/02/2016</a:t>
             </a:fld>
             <a:endParaRPr lang="en-CA"/>
           </a:p>
@@ -809,7 +809,7 @@
           <a:p>
             <a:fld id="{E9EBA66C-AAA3-4D08-8AFA-634FFF9E633D}" type="datetimeFigureOut">
               <a:rPr lang="en-CA" smtClean="0"/>
-              <a:t>17/02/2016</a:t>
+              <a:t>18/02/2016</a:t>
             </a:fld>
             <a:endParaRPr lang="en-CA"/>
           </a:p>
@@ -1055,7 +1055,7 @@
           <a:p>
             <a:fld id="{E9EBA66C-AAA3-4D08-8AFA-634FFF9E633D}" type="datetimeFigureOut">
               <a:rPr lang="en-CA" smtClean="0"/>
-              <a:t>17/02/2016</a:t>
+              <a:t>18/02/2016</a:t>
             </a:fld>
             <a:endParaRPr lang="en-CA"/>
           </a:p>
@@ -1343,7 +1343,7 @@
           <a:p>
             <a:fld id="{E9EBA66C-AAA3-4D08-8AFA-634FFF9E633D}" type="datetimeFigureOut">
               <a:rPr lang="en-CA" smtClean="0"/>
-              <a:t>17/02/2016</a:t>
+              <a:t>18/02/2016</a:t>
             </a:fld>
             <a:endParaRPr lang="en-CA"/>
           </a:p>
@@ -1765,7 +1765,7 @@
           <a:p>
             <a:fld id="{E9EBA66C-AAA3-4D08-8AFA-634FFF9E633D}" type="datetimeFigureOut">
               <a:rPr lang="en-CA" smtClean="0"/>
-              <a:t>17/02/2016</a:t>
+              <a:t>18/02/2016</a:t>
             </a:fld>
             <a:endParaRPr lang="en-CA"/>
           </a:p>
@@ -1883,7 +1883,7 @@
           <a:p>
             <a:fld id="{E9EBA66C-AAA3-4D08-8AFA-634FFF9E633D}" type="datetimeFigureOut">
               <a:rPr lang="en-CA" smtClean="0"/>
-              <a:t>17/02/2016</a:t>
+              <a:t>18/02/2016</a:t>
             </a:fld>
             <a:endParaRPr lang="en-CA"/>
           </a:p>
@@ -1978,7 +1978,7 @@
           <a:p>
             <a:fld id="{E9EBA66C-AAA3-4D08-8AFA-634FFF9E633D}" type="datetimeFigureOut">
               <a:rPr lang="en-CA" smtClean="0"/>
-              <a:t>17/02/2016</a:t>
+              <a:t>18/02/2016</a:t>
             </a:fld>
             <a:endParaRPr lang="en-CA"/>
           </a:p>
@@ -2255,7 +2255,7 @@
           <a:p>
             <a:fld id="{E9EBA66C-AAA3-4D08-8AFA-634FFF9E633D}" type="datetimeFigureOut">
               <a:rPr lang="en-CA" smtClean="0"/>
-              <a:t>17/02/2016</a:t>
+              <a:t>18/02/2016</a:t>
             </a:fld>
             <a:endParaRPr lang="en-CA"/>
           </a:p>
@@ -2508,7 +2508,7 @@
           <a:p>
             <a:fld id="{E9EBA66C-AAA3-4D08-8AFA-634FFF9E633D}" type="datetimeFigureOut">
               <a:rPr lang="en-CA" smtClean="0"/>
-              <a:t>17/02/2016</a:t>
+              <a:t>18/02/2016</a:t>
             </a:fld>
             <a:endParaRPr lang="en-CA"/>
           </a:p>
@@ -2721,7 +2721,7 @@
           <a:p>
             <a:fld id="{E9EBA66C-AAA3-4D08-8AFA-634FFF9E633D}" type="datetimeFigureOut">
               <a:rPr lang="en-CA" smtClean="0"/>
-              <a:t>17/02/2016</a:t>
+              <a:t>18/02/2016</a:t>
             </a:fld>
             <a:endParaRPr lang="en-CA"/>
           </a:p>
@@ -5008,8 +5008,8 @@
         </p:nvSpPr>
         <p:spPr>
           <a:xfrm>
-            <a:off x="3323092" y="3473295"/>
-            <a:ext cx="1248908" cy="400110"/>
+            <a:off x="3323091" y="3473295"/>
+            <a:ext cx="1710179" cy="553998"/>
           </a:xfrm>
           <a:prstGeom prst="rect">
             <a:avLst/>
@@ -5036,6 +5036,13 @@
               <a:rPr lang="en-CA" sz="1000" dirty="0" smtClean="0"/>
               <a:t>-Master</a:t>
             </a:r>
+          </a:p>
+          <a:p>
+            <a:r>
+              <a:rPr lang="en-CA" sz="1000" dirty="0" err="1" smtClean="0"/>
+              <a:t>noHeader-Master_fullname</a:t>
+            </a:r>
+            <a:endParaRPr lang="en-CA" sz="1000" dirty="0" smtClean="0"/>
           </a:p>
         </p:txBody>
       </p:sp>

</xml_diff>

<commit_message>
Documentation.docx, Collect files.jpg, Propagate files.jpg, Folder_structure.pptx: 	+ Updated documentation with collect and propagate procedures
hostInfoReports.ksh, convert2HTML.ksh:
	+ Added environmentCountReport.txt and convert it to
	environmentCountReport.html
</commit_message>
<xml_diff>
--- a/Folder_structure.pptx
+++ b/Folder_structure.pptx
@@ -7,6 +7,8 @@
   <p:sldIdLst>
     <p:sldId id="256" r:id="rId2"/>
     <p:sldId id="257" r:id="rId3"/>
+    <p:sldId id="258" r:id="rId4"/>
+    <p:sldId id="259" r:id="rId5"/>
   </p:sldIdLst>
   <p:sldSz cx="9144000" cy="6858000" type="screen4x3"/>
   <p:notesSz cx="6858000" cy="9144000"/>
@@ -289,7 +291,7 @@
           <a:p>
             <a:fld id="{E9EBA66C-AAA3-4D08-8AFA-634FFF9E633D}" type="datetimeFigureOut">
               <a:rPr lang="en-CA" smtClean="0"/>
-              <a:t>23/02/2016</a:t>
+              <a:t>21/04/2016</a:t>
             </a:fld>
             <a:endParaRPr lang="en-CA"/>
           </a:p>
@@ -459,7 +461,7 @@
           <a:p>
             <a:fld id="{E9EBA66C-AAA3-4D08-8AFA-634FFF9E633D}" type="datetimeFigureOut">
               <a:rPr lang="en-CA" smtClean="0"/>
-              <a:t>23/02/2016</a:t>
+              <a:t>21/04/2016</a:t>
             </a:fld>
             <a:endParaRPr lang="en-CA"/>
           </a:p>
@@ -639,7 +641,7 @@
           <a:p>
             <a:fld id="{E9EBA66C-AAA3-4D08-8AFA-634FFF9E633D}" type="datetimeFigureOut">
               <a:rPr lang="en-CA" smtClean="0"/>
-              <a:t>23/02/2016</a:t>
+              <a:t>21/04/2016</a:t>
             </a:fld>
             <a:endParaRPr lang="en-CA"/>
           </a:p>
@@ -809,7 +811,7 @@
           <a:p>
             <a:fld id="{E9EBA66C-AAA3-4D08-8AFA-634FFF9E633D}" type="datetimeFigureOut">
               <a:rPr lang="en-CA" smtClean="0"/>
-              <a:t>23/02/2016</a:t>
+              <a:t>21/04/2016</a:t>
             </a:fld>
             <a:endParaRPr lang="en-CA"/>
           </a:p>
@@ -1055,7 +1057,7 @@
           <a:p>
             <a:fld id="{E9EBA66C-AAA3-4D08-8AFA-634FFF9E633D}" type="datetimeFigureOut">
               <a:rPr lang="en-CA" smtClean="0"/>
-              <a:t>23/02/2016</a:t>
+              <a:t>21/04/2016</a:t>
             </a:fld>
             <a:endParaRPr lang="en-CA"/>
           </a:p>
@@ -1343,7 +1345,7 @@
           <a:p>
             <a:fld id="{E9EBA66C-AAA3-4D08-8AFA-634FFF9E633D}" type="datetimeFigureOut">
               <a:rPr lang="en-CA" smtClean="0"/>
-              <a:t>23/02/2016</a:t>
+              <a:t>21/04/2016</a:t>
             </a:fld>
             <a:endParaRPr lang="en-CA"/>
           </a:p>
@@ -1765,7 +1767,7 @@
           <a:p>
             <a:fld id="{E9EBA66C-AAA3-4D08-8AFA-634FFF9E633D}" type="datetimeFigureOut">
               <a:rPr lang="en-CA" smtClean="0"/>
-              <a:t>23/02/2016</a:t>
+              <a:t>21/04/2016</a:t>
             </a:fld>
             <a:endParaRPr lang="en-CA"/>
           </a:p>
@@ -1883,7 +1885,7 @@
           <a:p>
             <a:fld id="{E9EBA66C-AAA3-4D08-8AFA-634FFF9E633D}" type="datetimeFigureOut">
               <a:rPr lang="en-CA" smtClean="0"/>
-              <a:t>23/02/2016</a:t>
+              <a:t>21/04/2016</a:t>
             </a:fld>
             <a:endParaRPr lang="en-CA"/>
           </a:p>
@@ -1978,7 +1980,7 @@
           <a:p>
             <a:fld id="{E9EBA66C-AAA3-4D08-8AFA-634FFF9E633D}" type="datetimeFigureOut">
               <a:rPr lang="en-CA" smtClean="0"/>
-              <a:t>23/02/2016</a:t>
+              <a:t>21/04/2016</a:t>
             </a:fld>
             <a:endParaRPr lang="en-CA"/>
           </a:p>
@@ -2255,7 +2257,7 @@
           <a:p>
             <a:fld id="{E9EBA66C-AAA3-4D08-8AFA-634FFF9E633D}" type="datetimeFigureOut">
               <a:rPr lang="en-CA" smtClean="0"/>
-              <a:t>23/02/2016</a:t>
+              <a:t>21/04/2016</a:t>
             </a:fld>
             <a:endParaRPr lang="en-CA"/>
           </a:p>
@@ -2508,7 +2510,7 @@
           <a:p>
             <a:fld id="{E9EBA66C-AAA3-4D08-8AFA-634FFF9E633D}" type="datetimeFigureOut">
               <a:rPr lang="en-CA" smtClean="0"/>
-              <a:t>23/02/2016</a:t>
+              <a:t>21/04/2016</a:t>
             </a:fld>
             <a:endParaRPr lang="en-CA"/>
           </a:p>
@@ -2721,7 +2723,7 @@
           <a:p>
             <a:fld id="{E9EBA66C-AAA3-4D08-8AFA-634FFF9E633D}" type="datetimeFigureOut">
               <a:rPr lang="en-CA" smtClean="0"/>
-              <a:t>23/02/2016</a:t>
+              <a:t>21/04/2016</a:t>
             </a:fld>
             <a:endParaRPr lang="en-CA"/>
           </a:p>
@@ -4924,7 +4926,7 @@
         <p:spPr>
           <a:xfrm>
             <a:off x="5225004" y="3760922"/>
-            <a:ext cx="1370583" cy="553998"/>
+            <a:ext cx="1370583" cy="1477328"/>
           </a:xfrm>
           <a:prstGeom prst="rect">
             <a:avLst/>
@@ -4939,8 +4941,21 @@
           <a:p>
             <a:r>
               <a:rPr lang="en-CA" sz="1000" dirty="0" smtClean="0"/>
-              <a:t>hardwareReport.txt</a:t>
-            </a:r>
+              <a:t>hostInfoReport.txt</a:t>
+            </a:r>
+          </a:p>
+          <a:p>
+            <a:r>
+              <a:rPr lang="en-CA" sz="1000" dirty="0" smtClean="0"/>
+              <a:t>rackReport.txt</a:t>
+            </a:r>
+          </a:p>
+          <a:p>
+            <a:r>
+              <a:rPr lang="en-CA" sz="1000" dirty="0" smtClean="0"/>
+              <a:t>appsReport.txt</a:t>
+            </a:r>
+            <a:endParaRPr lang="en-CA" sz="1000" dirty="0" smtClean="0"/>
           </a:p>
           <a:p>
             <a:r>
@@ -4953,6 +4968,15 @@
               <a:rPr lang="en-CA" sz="1000" dirty="0" smtClean="0"/>
               <a:t>zonelistReport.txt</a:t>
             </a:r>
+          </a:p>
+          <a:p>
+            <a:r>
+              <a:rPr lang="en-CA" sz="1000" dirty="0" smtClean="0"/>
+              <a:t>(and their corresponding html version)</a:t>
+            </a:r>
+          </a:p>
+          <a:p>
+            <a:endParaRPr lang="en-CA" sz="1000" dirty="0" smtClean="0"/>
           </a:p>
         </p:txBody>
       </p:sp>
@@ -5182,6 +5206,1683 @@
     <p:extLst>
       <p:ext uri="{BB962C8B-B14F-4D97-AF65-F5344CB8AC3E}">
         <p14:creationId xmlns:p14="http://schemas.microsoft.com/office/powerpoint/2010/main" val="242636938"/>
+      </p:ext>
+    </p:extLst>
+  </p:cSld>
+  <p:clrMapOvr>
+    <a:masterClrMapping/>
+  </p:clrMapOvr>
+</p:sld>
+</file>
+
+<file path=ppt/slides/slide3.xml><?xml version="1.0" encoding="utf-8"?>
+<p:sld xmlns:a="http://schemas.openxmlformats.org/drawingml/2006/main" xmlns:r="http://schemas.openxmlformats.org/officeDocument/2006/relationships" xmlns:p="http://schemas.openxmlformats.org/presentationml/2006/main">
+  <p:cSld>
+    <p:spTree>
+      <p:nvGrpSpPr>
+        <p:cNvPr id="1" name=""/>
+        <p:cNvGrpSpPr/>
+        <p:nvPr/>
+      </p:nvGrpSpPr>
+      <p:grpSpPr>
+        <a:xfrm>
+          <a:off x="0" y="0"/>
+          <a:ext cx="0" cy="0"/>
+          <a:chOff x="0" y="0"/>
+          <a:chExt cx="0" cy="0"/>
+        </a:xfrm>
+      </p:grpSpPr>
+      <p:sp>
+        <p:nvSpPr>
+          <p:cNvPr id="4" name="Rectangle 3"/>
+          <p:cNvSpPr/>
+          <p:nvPr/>
+        </p:nvSpPr>
+        <p:spPr>
+          <a:xfrm>
+            <a:off x="3779912" y="260648"/>
+            <a:ext cx="2088232" cy="720080"/>
+          </a:xfrm>
+          <a:prstGeom prst="rect">
+            <a:avLst/>
+          </a:prstGeom>
+          <a:solidFill>
+            <a:schemeClr val="tx2">
+              <a:lumMod val="75000"/>
+            </a:schemeClr>
+          </a:solidFill>
+          <a:ln w="15875">
+            <a:solidFill>
+              <a:schemeClr val="tx1"/>
+            </a:solidFill>
+          </a:ln>
+        </p:spPr>
+        <p:style>
+          <a:lnRef idx="2">
+            <a:schemeClr val="accent1">
+              <a:shade val="50000"/>
+            </a:schemeClr>
+          </a:lnRef>
+          <a:fillRef idx="1">
+            <a:schemeClr val="accent1"/>
+          </a:fillRef>
+          <a:effectRef idx="0">
+            <a:schemeClr val="accent1"/>
+          </a:effectRef>
+          <a:fontRef idx="minor">
+            <a:schemeClr val="lt1"/>
+          </a:fontRef>
+        </p:style>
+        <p:txBody>
+          <a:bodyPr rtlCol="0" anchor="ctr"/>
+          <a:lstStyle/>
+          <a:p>
+            <a:pPr algn="ctr"/>
+            <a:r>
+              <a:rPr lang="en-CA" dirty="0" smtClean="0">
+                <a:solidFill>
+                  <a:srgbClr val="FF0000"/>
+                </a:solidFill>
+              </a:rPr>
+              <a:t>Master</a:t>
+            </a:r>
+          </a:p>
+        </p:txBody>
+      </p:sp>
+      <p:sp>
+        <p:nvSpPr>
+          <p:cNvPr id="6" name="Rectangle 5"/>
+          <p:cNvSpPr/>
+          <p:nvPr/>
+        </p:nvSpPr>
+        <p:spPr>
+          <a:xfrm>
+            <a:off x="1259632" y="2852936"/>
+            <a:ext cx="504056" cy="504056"/>
+          </a:xfrm>
+          <a:prstGeom prst="rect">
+            <a:avLst/>
+          </a:prstGeom>
+          <a:solidFill>
+            <a:schemeClr val="bg1"/>
+          </a:solidFill>
+          <a:ln w="15875">
+            <a:solidFill>
+              <a:schemeClr val="tx1"/>
+            </a:solidFill>
+          </a:ln>
+        </p:spPr>
+        <p:style>
+          <a:lnRef idx="2">
+            <a:schemeClr val="accent1">
+              <a:shade val="50000"/>
+            </a:schemeClr>
+          </a:lnRef>
+          <a:fillRef idx="1">
+            <a:schemeClr val="accent1"/>
+          </a:fillRef>
+          <a:effectRef idx="0">
+            <a:schemeClr val="accent1"/>
+          </a:effectRef>
+          <a:fontRef idx="minor">
+            <a:schemeClr val="lt1"/>
+          </a:fontRef>
+        </p:style>
+        <p:txBody>
+          <a:bodyPr rtlCol="0" anchor="ctr"/>
+          <a:lstStyle/>
+          <a:p>
+            <a:pPr algn="ctr"/>
+            <a:r>
+              <a:rPr lang="en-CA" dirty="0" smtClean="0">
+                <a:solidFill>
+                  <a:schemeClr val="tx1"/>
+                </a:solidFill>
+              </a:rPr>
+              <a:t>G</a:t>
+            </a:r>
+            <a:endParaRPr lang="en-CA" dirty="0">
+              <a:solidFill>
+                <a:schemeClr val="tx1"/>
+              </a:solidFill>
+            </a:endParaRPr>
+          </a:p>
+        </p:txBody>
+      </p:sp>
+      <p:sp>
+        <p:nvSpPr>
+          <p:cNvPr id="7" name="Rectangle 6"/>
+          <p:cNvSpPr/>
+          <p:nvPr/>
+        </p:nvSpPr>
+        <p:spPr>
+          <a:xfrm>
+            <a:off x="4572000" y="2852936"/>
+            <a:ext cx="504056" cy="504056"/>
+          </a:xfrm>
+          <a:prstGeom prst="rect">
+            <a:avLst/>
+          </a:prstGeom>
+          <a:solidFill>
+            <a:schemeClr val="bg1"/>
+          </a:solidFill>
+          <a:ln w="15875">
+            <a:solidFill>
+              <a:schemeClr val="tx1"/>
+            </a:solidFill>
+          </a:ln>
+        </p:spPr>
+        <p:style>
+          <a:lnRef idx="2">
+            <a:schemeClr val="accent1">
+              <a:shade val="50000"/>
+            </a:schemeClr>
+          </a:lnRef>
+          <a:fillRef idx="1">
+            <a:schemeClr val="accent1"/>
+          </a:fillRef>
+          <a:effectRef idx="0">
+            <a:schemeClr val="accent1"/>
+          </a:effectRef>
+          <a:fontRef idx="minor">
+            <a:schemeClr val="lt1"/>
+          </a:fontRef>
+        </p:style>
+        <p:txBody>
+          <a:bodyPr rtlCol="0" anchor="ctr"/>
+          <a:lstStyle/>
+          <a:p>
+            <a:pPr algn="ctr"/>
+            <a:r>
+              <a:rPr lang="en-CA" dirty="0" smtClean="0">
+                <a:solidFill>
+                  <a:schemeClr val="tx1"/>
+                </a:solidFill>
+              </a:rPr>
+              <a:t>G</a:t>
+            </a:r>
+            <a:endParaRPr lang="en-CA" dirty="0">
+              <a:solidFill>
+                <a:schemeClr val="tx1"/>
+              </a:solidFill>
+            </a:endParaRPr>
+          </a:p>
+        </p:txBody>
+      </p:sp>
+      <p:sp>
+        <p:nvSpPr>
+          <p:cNvPr id="8" name="Rectangle 7"/>
+          <p:cNvSpPr/>
+          <p:nvPr/>
+        </p:nvSpPr>
+        <p:spPr>
+          <a:xfrm>
+            <a:off x="7884368" y="2852936"/>
+            <a:ext cx="504056" cy="504056"/>
+          </a:xfrm>
+          <a:prstGeom prst="rect">
+            <a:avLst/>
+          </a:prstGeom>
+          <a:solidFill>
+            <a:schemeClr val="bg1"/>
+          </a:solidFill>
+          <a:ln w="15875">
+            <a:solidFill>
+              <a:schemeClr val="tx1"/>
+            </a:solidFill>
+          </a:ln>
+        </p:spPr>
+        <p:style>
+          <a:lnRef idx="2">
+            <a:schemeClr val="accent1">
+              <a:shade val="50000"/>
+            </a:schemeClr>
+          </a:lnRef>
+          <a:fillRef idx="1">
+            <a:schemeClr val="accent1"/>
+          </a:fillRef>
+          <a:effectRef idx="0">
+            <a:schemeClr val="accent1"/>
+          </a:effectRef>
+          <a:fontRef idx="minor">
+            <a:schemeClr val="lt1"/>
+          </a:fontRef>
+        </p:style>
+        <p:txBody>
+          <a:bodyPr rtlCol="0" anchor="ctr"/>
+          <a:lstStyle/>
+          <a:p>
+            <a:pPr algn="ctr"/>
+            <a:r>
+              <a:rPr lang="en-CA" dirty="0" smtClean="0">
+                <a:solidFill>
+                  <a:schemeClr val="tx1"/>
+                </a:solidFill>
+              </a:rPr>
+              <a:t>G</a:t>
+            </a:r>
+            <a:endParaRPr lang="en-CA" dirty="0">
+              <a:solidFill>
+                <a:schemeClr val="tx1"/>
+              </a:solidFill>
+            </a:endParaRPr>
+          </a:p>
+        </p:txBody>
+      </p:sp>
+      <p:sp>
+        <p:nvSpPr>
+          <p:cNvPr id="9" name="Oval 8"/>
+          <p:cNvSpPr/>
+          <p:nvPr/>
+        </p:nvSpPr>
+        <p:spPr>
+          <a:xfrm>
+            <a:off x="611560" y="5373216"/>
+            <a:ext cx="360040" cy="360040"/>
+          </a:xfrm>
+          <a:prstGeom prst="ellipse">
+            <a:avLst/>
+          </a:prstGeom>
+        </p:spPr>
+        <p:style>
+          <a:lnRef idx="2">
+            <a:schemeClr val="accent1">
+              <a:shade val="50000"/>
+            </a:schemeClr>
+          </a:lnRef>
+          <a:fillRef idx="1">
+            <a:schemeClr val="accent1"/>
+          </a:fillRef>
+          <a:effectRef idx="0">
+            <a:schemeClr val="accent1"/>
+          </a:effectRef>
+          <a:fontRef idx="minor">
+            <a:schemeClr val="lt1"/>
+          </a:fontRef>
+        </p:style>
+        <p:txBody>
+          <a:bodyPr rtlCol="0" anchor="ctr"/>
+          <a:lstStyle/>
+          <a:p>
+            <a:pPr algn="ctr"/>
+            <a:endParaRPr lang="en-CA"/>
+          </a:p>
+        </p:txBody>
+      </p:sp>
+      <p:sp>
+        <p:nvSpPr>
+          <p:cNvPr id="10" name="Oval 9"/>
+          <p:cNvSpPr/>
+          <p:nvPr/>
+        </p:nvSpPr>
+        <p:spPr>
+          <a:xfrm>
+            <a:off x="2051720" y="5373216"/>
+            <a:ext cx="360040" cy="360040"/>
+          </a:xfrm>
+          <a:prstGeom prst="ellipse">
+            <a:avLst/>
+          </a:prstGeom>
+        </p:spPr>
+        <p:style>
+          <a:lnRef idx="2">
+            <a:schemeClr val="accent1">
+              <a:shade val="50000"/>
+            </a:schemeClr>
+          </a:lnRef>
+          <a:fillRef idx="1">
+            <a:schemeClr val="accent1"/>
+          </a:fillRef>
+          <a:effectRef idx="0">
+            <a:schemeClr val="accent1"/>
+          </a:effectRef>
+          <a:fontRef idx="minor">
+            <a:schemeClr val="lt1"/>
+          </a:fontRef>
+        </p:style>
+        <p:txBody>
+          <a:bodyPr rtlCol="0" anchor="ctr"/>
+          <a:lstStyle/>
+          <a:p>
+            <a:pPr algn="ctr"/>
+            <a:endParaRPr lang="en-CA"/>
+          </a:p>
+        </p:txBody>
+      </p:sp>
+      <p:sp>
+        <p:nvSpPr>
+          <p:cNvPr id="11" name="Oval 10"/>
+          <p:cNvSpPr/>
+          <p:nvPr/>
+        </p:nvSpPr>
+        <p:spPr>
+          <a:xfrm>
+            <a:off x="3923928" y="5373216"/>
+            <a:ext cx="360040" cy="360040"/>
+          </a:xfrm>
+          <a:prstGeom prst="ellipse">
+            <a:avLst/>
+          </a:prstGeom>
+        </p:spPr>
+        <p:style>
+          <a:lnRef idx="2">
+            <a:schemeClr val="accent1">
+              <a:shade val="50000"/>
+            </a:schemeClr>
+          </a:lnRef>
+          <a:fillRef idx="1">
+            <a:schemeClr val="accent1"/>
+          </a:fillRef>
+          <a:effectRef idx="0">
+            <a:schemeClr val="accent1"/>
+          </a:effectRef>
+          <a:fontRef idx="minor">
+            <a:schemeClr val="lt1"/>
+          </a:fontRef>
+        </p:style>
+        <p:txBody>
+          <a:bodyPr rtlCol="0" anchor="ctr"/>
+          <a:lstStyle/>
+          <a:p>
+            <a:pPr algn="ctr"/>
+            <a:endParaRPr lang="en-CA"/>
+          </a:p>
+        </p:txBody>
+      </p:sp>
+      <p:sp>
+        <p:nvSpPr>
+          <p:cNvPr id="12" name="Oval 11"/>
+          <p:cNvSpPr/>
+          <p:nvPr/>
+        </p:nvSpPr>
+        <p:spPr>
+          <a:xfrm>
+            <a:off x="4716016" y="5345596"/>
+            <a:ext cx="360040" cy="360040"/>
+          </a:xfrm>
+          <a:prstGeom prst="ellipse">
+            <a:avLst/>
+          </a:prstGeom>
+        </p:spPr>
+        <p:style>
+          <a:lnRef idx="2">
+            <a:schemeClr val="accent1">
+              <a:shade val="50000"/>
+            </a:schemeClr>
+          </a:lnRef>
+          <a:fillRef idx="1">
+            <a:schemeClr val="accent1"/>
+          </a:fillRef>
+          <a:effectRef idx="0">
+            <a:schemeClr val="accent1"/>
+          </a:effectRef>
+          <a:fontRef idx="minor">
+            <a:schemeClr val="lt1"/>
+          </a:fontRef>
+        </p:style>
+        <p:txBody>
+          <a:bodyPr rtlCol="0" anchor="ctr"/>
+          <a:lstStyle/>
+          <a:p>
+            <a:pPr algn="ctr"/>
+            <a:endParaRPr lang="en-CA"/>
+          </a:p>
+        </p:txBody>
+      </p:sp>
+      <p:sp>
+        <p:nvSpPr>
+          <p:cNvPr id="13" name="Oval 12"/>
+          <p:cNvSpPr/>
+          <p:nvPr/>
+        </p:nvSpPr>
+        <p:spPr>
+          <a:xfrm>
+            <a:off x="5436096" y="5345596"/>
+            <a:ext cx="360040" cy="360040"/>
+          </a:xfrm>
+          <a:prstGeom prst="ellipse">
+            <a:avLst/>
+          </a:prstGeom>
+        </p:spPr>
+        <p:style>
+          <a:lnRef idx="2">
+            <a:schemeClr val="accent1">
+              <a:shade val="50000"/>
+            </a:schemeClr>
+          </a:lnRef>
+          <a:fillRef idx="1">
+            <a:schemeClr val="accent1"/>
+          </a:fillRef>
+          <a:effectRef idx="0">
+            <a:schemeClr val="accent1"/>
+          </a:effectRef>
+          <a:fontRef idx="minor">
+            <a:schemeClr val="lt1"/>
+          </a:fontRef>
+        </p:style>
+        <p:txBody>
+          <a:bodyPr rtlCol="0" anchor="ctr"/>
+          <a:lstStyle/>
+          <a:p>
+            <a:pPr algn="ctr"/>
+            <a:endParaRPr lang="en-CA"/>
+          </a:p>
+        </p:txBody>
+      </p:sp>
+      <p:sp>
+        <p:nvSpPr>
+          <p:cNvPr id="14" name="Oval 13"/>
+          <p:cNvSpPr/>
+          <p:nvPr/>
+        </p:nvSpPr>
+        <p:spPr>
+          <a:xfrm>
+            <a:off x="7956376" y="5373216"/>
+            <a:ext cx="360040" cy="360040"/>
+          </a:xfrm>
+          <a:prstGeom prst="ellipse">
+            <a:avLst/>
+          </a:prstGeom>
+        </p:spPr>
+        <p:style>
+          <a:lnRef idx="2">
+            <a:schemeClr val="accent1">
+              <a:shade val="50000"/>
+            </a:schemeClr>
+          </a:lnRef>
+          <a:fillRef idx="1">
+            <a:schemeClr val="accent1"/>
+          </a:fillRef>
+          <a:effectRef idx="0">
+            <a:schemeClr val="accent1"/>
+          </a:effectRef>
+          <a:fontRef idx="minor">
+            <a:schemeClr val="lt1"/>
+          </a:fontRef>
+        </p:style>
+        <p:txBody>
+          <a:bodyPr rtlCol="0" anchor="ctr"/>
+          <a:lstStyle/>
+          <a:p>
+            <a:pPr algn="ctr"/>
+            <a:endParaRPr lang="en-CA"/>
+          </a:p>
+        </p:txBody>
+      </p:sp>
+      <p:cxnSp>
+        <p:nvCxnSpPr>
+          <p:cNvPr id="16" name="Straight Arrow Connector 15"/>
+          <p:cNvCxnSpPr>
+            <a:stCxn id="9" idx="0"/>
+            <a:endCxn id="6" idx="2"/>
+          </p:cNvCxnSpPr>
+          <p:nvPr/>
+        </p:nvCxnSpPr>
+        <p:spPr>
+          <a:xfrm flipV="1">
+            <a:off x="791580" y="3356992"/>
+            <a:ext cx="720080" cy="2016224"/>
+          </a:xfrm>
+          <a:prstGeom prst="straightConnector1">
+            <a:avLst/>
+          </a:prstGeom>
+          <a:ln w="38100">
+            <a:tailEnd type="arrow"/>
+          </a:ln>
+        </p:spPr>
+        <p:style>
+          <a:lnRef idx="1">
+            <a:schemeClr val="dk1"/>
+          </a:lnRef>
+          <a:fillRef idx="0">
+            <a:schemeClr val="dk1"/>
+          </a:fillRef>
+          <a:effectRef idx="0">
+            <a:schemeClr val="dk1"/>
+          </a:effectRef>
+          <a:fontRef idx="minor">
+            <a:schemeClr val="tx1"/>
+          </a:fontRef>
+        </p:style>
+      </p:cxnSp>
+      <p:cxnSp>
+        <p:nvCxnSpPr>
+          <p:cNvPr id="18" name="Straight Arrow Connector 17"/>
+          <p:cNvCxnSpPr>
+            <a:stCxn id="10" idx="0"/>
+            <a:endCxn id="6" idx="2"/>
+          </p:cNvCxnSpPr>
+          <p:nvPr/>
+        </p:nvCxnSpPr>
+        <p:spPr>
+          <a:xfrm flipH="1" flipV="1">
+            <a:off x="1511660" y="3356992"/>
+            <a:ext cx="720080" cy="2016224"/>
+          </a:xfrm>
+          <a:prstGeom prst="straightConnector1">
+            <a:avLst/>
+          </a:prstGeom>
+          <a:ln w="38100">
+            <a:tailEnd type="arrow"/>
+          </a:ln>
+        </p:spPr>
+        <p:style>
+          <a:lnRef idx="1">
+            <a:schemeClr val="dk1"/>
+          </a:lnRef>
+          <a:fillRef idx="0">
+            <a:schemeClr val="dk1"/>
+          </a:fillRef>
+          <a:effectRef idx="0">
+            <a:schemeClr val="dk1"/>
+          </a:effectRef>
+          <a:fontRef idx="minor">
+            <a:schemeClr val="tx1"/>
+          </a:fontRef>
+        </p:style>
+      </p:cxnSp>
+      <p:cxnSp>
+        <p:nvCxnSpPr>
+          <p:cNvPr id="21" name="Straight Arrow Connector 20"/>
+          <p:cNvCxnSpPr>
+            <a:stCxn id="11" idx="0"/>
+            <a:endCxn id="7" idx="2"/>
+          </p:cNvCxnSpPr>
+          <p:nvPr/>
+        </p:nvCxnSpPr>
+        <p:spPr>
+          <a:xfrm flipV="1">
+            <a:off x="4103948" y="3356992"/>
+            <a:ext cx="720080" cy="2016224"/>
+          </a:xfrm>
+          <a:prstGeom prst="straightConnector1">
+            <a:avLst/>
+          </a:prstGeom>
+          <a:ln w="38100">
+            <a:tailEnd type="arrow"/>
+          </a:ln>
+        </p:spPr>
+        <p:style>
+          <a:lnRef idx="1">
+            <a:schemeClr val="dk1"/>
+          </a:lnRef>
+          <a:fillRef idx="0">
+            <a:schemeClr val="dk1"/>
+          </a:fillRef>
+          <a:effectRef idx="0">
+            <a:schemeClr val="dk1"/>
+          </a:effectRef>
+          <a:fontRef idx="minor">
+            <a:schemeClr val="tx1"/>
+          </a:fontRef>
+        </p:style>
+      </p:cxnSp>
+      <p:cxnSp>
+        <p:nvCxnSpPr>
+          <p:cNvPr id="24" name="Straight Arrow Connector 23"/>
+          <p:cNvCxnSpPr>
+            <a:stCxn id="12" idx="0"/>
+            <a:endCxn id="7" idx="2"/>
+          </p:cNvCxnSpPr>
+          <p:nvPr/>
+        </p:nvCxnSpPr>
+        <p:spPr>
+          <a:xfrm flipH="1" flipV="1">
+            <a:off x="4824028" y="3356992"/>
+            <a:ext cx="72008" cy="1988604"/>
+          </a:xfrm>
+          <a:prstGeom prst="straightConnector1">
+            <a:avLst/>
+          </a:prstGeom>
+          <a:ln w="38100">
+            <a:tailEnd type="arrow"/>
+          </a:ln>
+        </p:spPr>
+        <p:style>
+          <a:lnRef idx="1">
+            <a:schemeClr val="dk1"/>
+          </a:lnRef>
+          <a:fillRef idx="0">
+            <a:schemeClr val="dk1"/>
+          </a:fillRef>
+          <a:effectRef idx="0">
+            <a:schemeClr val="dk1"/>
+          </a:effectRef>
+          <a:fontRef idx="minor">
+            <a:schemeClr val="tx1"/>
+          </a:fontRef>
+        </p:style>
+      </p:cxnSp>
+      <p:cxnSp>
+        <p:nvCxnSpPr>
+          <p:cNvPr id="27" name="Straight Arrow Connector 26"/>
+          <p:cNvCxnSpPr>
+            <a:stCxn id="13" idx="0"/>
+            <a:endCxn id="7" idx="2"/>
+          </p:cNvCxnSpPr>
+          <p:nvPr/>
+        </p:nvCxnSpPr>
+        <p:spPr>
+          <a:xfrm flipH="1" flipV="1">
+            <a:off x="4824028" y="3356992"/>
+            <a:ext cx="792088" cy="1988604"/>
+          </a:xfrm>
+          <a:prstGeom prst="straightConnector1">
+            <a:avLst/>
+          </a:prstGeom>
+          <a:ln w="38100">
+            <a:tailEnd type="arrow"/>
+          </a:ln>
+        </p:spPr>
+        <p:style>
+          <a:lnRef idx="1">
+            <a:schemeClr val="dk1"/>
+          </a:lnRef>
+          <a:fillRef idx="0">
+            <a:schemeClr val="dk1"/>
+          </a:fillRef>
+          <a:effectRef idx="0">
+            <a:schemeClr val="dk1"/>
+          </a:effectRef>
+          <a:fontRef idx="minor">
+            <a:schemeClr val="tx1"/>
+          </a:fontRef>
+        </p:style>
+      </p:cxnSp>
+      <p:cxnSp>
+        <p:nvCxnSpPr>
+          <p:cNvPr id="30" name="Straight Arrow Connector 29"/>
+          <p:cNvCxnSpPr>
+            <a:stCxn id="14" idx="0"/>
+            <a:endCxn id="8" idx="2"/>
+          </p:cNvCxnSpPr>
+          <p:nvPr/>
+        </p:nvCxnSpPr>
+        <p:spPr>
+          <a:xfrm flipV="1">
+            <a:off x="8136396" y="3356992"/>
+            <a:ext cx="0" cy="2016224"/>
+          </a:xfrm>
+          <a:prstGeom prst="straightConnector1">
+            <a:avLst/>
+          </a:prstGeom>
+          <a:ln w="38100">
+            <a:tailEnd type="arrow"/>
+          </a:ln>
+        </p:spPr>
+        <p:style>
+          <a:lnRef idx="1">
+            <a:schemeClr val="dk1"/>
+          </a:lnRef>
+          <a:fillRef idx="0">
+            <a:schemeClr val="dk1"/>
+          </a:fillRef>
+          <a:effectRef idx="0">
+            <a:schemeClr val="dk1"/>
+          </a:effectRef>
+          <a:fontRef idx="minor">
+            <a:schemeClr val="tx1"/>
+          </a:fontRef>
+        </p:style>
+      </p:cxnSp>
+      <p:cxnSp>
+        <p:nvCxnSpPr>
+          <p:cNvPr id="33" name="Straight Arrow Connector 32"/>
+          <p:cNvCxnSpPr>
+            <a:stCxn id="6" idx="0"/>
+            <a:endCxn id="4" idx="2"/>
+          </p:cNvCxnSpPr>
+          <p:nvPr/>
+        </p:nvCxnSpPr>
+        <p:spPr>
+          <a:xfrm flipV="1">
+            <a:off x="1511660" y="980728"/>
+            <a:ext cx="3312368" cy="1872208"/>
+          </a:xfrm>
+          <a:prstGeom prst="straightConnector1">
+            <a:avLst/>
+          </a:prstGeom>
+          <a:ln w="28575">
+            <a:tailEnd type="arrow"/>
+          </a:ln>
+        </p:spPr>
+        <p:style>
+          <a:lnRef idx="1">
+            <a:schemeClr val="accent6"/>
+          </a:lnRef>
+          <a:fillRef idx="0">
+            <a:schemeClr val="accent6"/>
+          </a:fillRef>
+          <a:effectRef idx="0">
+            <a:schemeClr val="accent6"/>
+          </a:effectRef>
+          <a:fontRef idx="minor">
+            <a:schemeClr val="tx1"/>
+          </a:fontRef>
+        </p:style>
+      </p:cxnSp>
+      <p:cxnSp>
+        <p:nvCxnSpPr>
+          <p:cNvPr id="36" name="Straight Arrow Connector 35"/>
+          <p:cNvCxnSpPr>
+            <a:stCxn id="7" idx="0"/>
+            <a:endCxn id="4" idx="2"/>
+          </p:cNvCxnSpPr>
+          <p:nvPr/>
+        </p:nvCxnSpPr>
+        <p:spPr>
+          <a:xfrm flipV="1">
+            <a:off x="4824028" y="980728"/>
+            <a:ext cx="0" cy="1872208"/>
+          </a:xfrm>
+          <a:prstGeom prst="straightConnector1">
+            <a:avLst/>
+          </a:prstGeom>
+          <a:ln w="28575">
+            <a:tailEnd type="arrow"/>
+          </a:ln>
+        </p:spPr>
+        <p:style>
+          <a:lnRef idx="1">
+            <a:schemeClr val="accent6"/>
+          </a:lnRef>
+          <a:fillRef idx="0">
+            <a:schemeClr val="accent6"/>
+          </a:fillRef>
+          <a:effectRef idx="0">
+            <a:schemeClr val="accent6"/>
+          </a:effectRef>
+          <a:fontRef idx="minor">
+            <a:schemeClr val="tx1"/>
+          </a:fontRef>
+        </p:style>
+      </p:cxnSp>
+      <p:cxnSp>
+        <p:nvCxnSpPr>
+          <p:cNvPr id="39" name="Straight Arrow Connector 38"/>
+          <p:cNvCxnSpPr>
+            <a:stCxn id="8" idx="0"/>
+            <a:endCxn id="4" idx="2"/>
+          </p:cNvCxnSpPr>
+          <p:nvPr/>
+        </p:nvCxnSpPr>
+        <p:spPr>
+          <a:xfrm flipH="1" flipV="1">
+            <a:off x="4824028" y="980728"/>
+            <a:ext cx="3312368" cy="1872208"/>
+          </a:xfrm>
+          <a:prstGeom prst="straightConnector1">
+            <a:avLst/>
+          </a:prstGeom>
+          <a:ln w="28575">
+            <a:tailEnd type="arrow"/>
+          </a:ln>
+        </p:spPr>
+        <p:style>
+          <a:lnRef idx="1">
+            <a:schemeClr val="accent6"/>
+          </a:lnRef>
+          <a:fillRef idx="0">
+            <a:schemeClr val="accent6"/>
+          </a:fillRef>
+          <a:effectRef idx="0">
+            <a:schemeClr val="accent6"/>
+          </a:effectRef>
+          <a:fontRef idx="minor">
+            <a:schemeClr val="tx1"/>
+          </a:fontRef>
+        </p:style>
+      </p:cxnSp>
+    </p:spTree>
+    <p:extLst>
+      <p:ext uri="{BB962C8B-B14F-4D97-AF65-F5344CB8AC3E}">
+        <p14:creationId xmlns:p14="http://schemas.microsoft.com/office/powerpoint/2010/main" val="4211651710"/>
+      </p:ext>
+    </p:extLst>
+  </p:cSld>
+  <p:clrMapOvr>
+    <a:masterClrMapping/>
+  </p:clrMapOvr>
+</p:sld>
+</file>
+
+<file path=ppt/slides/slide4.xml><?xml version="1.0" encoding="utf-8"?>
+<p:sld xmlns:a="http://schemas.openxmlformats.org/drawingml/2006/main" xmlns:r="http://schemas.openxmlformats.org/officeDocument/2006/relationships" xmlns:p="http://schemas.openxmlformats.org/presentationml/2006/main">
+  <p:cSld>
+    <p:spTree>
+      <p:nvGrpSpPr>
+        <p:cNvPr id="1" name=""/>
+        <p:cNvGrpSpPr/>
+        <p:nvPr/>
+      </p:nvGrpSpPr>
+      <p:grpSpPr>
+        <a:xfrm>
+          <a:off x="0" y="0"/>
+          <a:ext cx="0" cy="0"/>
+          <a:chOff x="0" y="0"/>
+          <a:chExt cx="0" cy="0"/>
+        </a:xfrm>
+      </p:grpSpPr>
+      <p:sp>
+        <p:nvSpPr>
+          <p:cNvPr id="4" name="Rectangle 3"/>
+          <p:cNvSpPr/>
+          <p:nvPr/>
+        </p:nvSpPr>
+        <p:spPr>
+          <a:xfrm>
+            <a:off x="3779912" y="260648"/>
+            <a:ext cx="2088232" cy="720080"/>
+          </a:xfrm>
+          <a:prstGeom prst="rect">
+            <a:avLst/>
+          </a:prstGeom>
+          <a:solidFill>
+            <a:schemeClr val="tx2">
+              <a:lumMod val="75000"/>
+            </a:schemeClr>
+          </a:solidFill>
+          <a:ln w="15875">
+            <a:solidFill>
+              <a:schemeClr val="tx1"/>
+            </a:solidFill>
+          </a:ln>
+        </p:spPr>
+        <p:style>
+          <a:lnRef idx="2">
+            <a:schemeClr val="accent1">
+              <a:shade val="50000"/>
+            </a:schemeClr>
+          </a:lnRef>
+          <a:fillRef idx="1">
+            <a:schemeClr val="accent1"/>
+          </a:fillRef>
+          <a:effectRef idx="0">
+            <a:schemeClr val="accent1"/>
+          </a:effectRef>
+          <a:fontRef idx="minor">
+            <a:schemeClr val="lt1"/>
+          </a:fontRef>
+        </p:style>
+        <p:txBody>
+          <a:bodyPr rtlCol="0" anchor="ctr"/>
+          <a:lstStyle/>
+          <a:p>
+            <a:pPr algn="ctr"/>
+            <a:r>
+              <a:rPr lang="en-CA" dirty="0" smtClean="0">
+                <a:solidFill>
+                  <a:srgbClr val="FF0000"/>
+                </a:solidFill>
+              </a:rPr>
+              <a:t>Master</a:t>
+            </a:r>
+          </a:p>
+        </p:txBody>
+      </p:sp>
+      <p:sp>
+        <p:nvSpPr>
+          <p:cNvPr id="6" name="Rectangle 5"/>
+          <p:cNvSpPr/>
+          <p:nvPr/>
+        </p:nvSpPr>
+        <p:spPr>
+          <a:xfrm>
+            <a:off x="1259632" y="2852936"/>
+            <a:ext cx="504056" cy="504056"/>
+          </a:xfrm>
+          <a:prstGeom prst="rect">
+            <a:avLst/>
+          </a:prstGeom>
+          <a:solidFill>
+            <a:schemeClr val="bg1"/>
+          </a:solidFill>
+          <a:ln w="15875">
+            <a:solidFill>
+              <a:schemeClr val="tx1"/>
+            </a:solidFill>
+          </a:ln>
+        </p:spPr>
+        <p:style>
+          <a:lnRef idx="2">
+            <a:schemeClr val="accent1">
+              <a:shade val="50000"/>
+            </a:schemeClr>
+          </a:lnRef>
+          <a:fillRef idx="1">
+            <a:schemeClr val="accent1"/>
+          </a:fillRef>
+          <a:effectRef idx="0">
+            <a:schemeClr val="accent1"/>
+          </a:effectRef>
+          <a:fontRef idx="minor">
+            <a:schemeClr val="lt1"/>
+          </a:fontRef>
+        </p:style>
+        <p:txBody>
+          <a:bodyPr rtlCol="0" anchor="ctr"/>
+          <a:lstStyle/>
+          <a:p>
+            <a:pPr algn="ctr"/>
+            <a:r>
+              <a:rPr lang="en-CA" dirty="0" smtClean="0">
+                <a:solidFill>
+                  <a:schemeClr val="tx1"/>
+                </a:solidFill>
+              </a:rPr>
+              <a:t>G</a:t>
+            </a:r>
+            <a:endParaRPr lang="en-CA" dirty="0">
+              <a:solidFill>
+                <a:schemeClr val="tx1"/>
+              </a:solidFill>
+            </a:endParaRPr>
+          </a:p>
+        </p:txBody>
+      </p:sp>
+      <p:sp>
+        <p:nvSpPr>
+          <p:cNvPr id="7" name="Rectangle 6"/>
+          <p:cNvSpPr/>
+          <p:nvPr/>
+        </p:nvSpPr>
+        <p:spPr>
+          <a:xfrm>
+            <a:off x="4572000" y="2852936"/>
+            <a:ext cx="504056" cy="504056"/>
+          </a:xfrm>
+          <a:prstGeom prst="rect">
+            <a:avLst/>
+          </a:prstGeom>
+          <a:solidFill>
+            <a:schemeClr val="bg1"/>
+          </a:solidFill>
+          <a:ln w="15875">
+            <a:solidFill>
+              <a:schemeClr val="tx1"/>
+            </a:solidFill>
+          </a:ln>
+        </p:spPr>
+        <p:style>
+          <a:lnRef idx="2">
+            <a:schemeClr val="accent1">
+              <a:shade val="50000"/>
+            </a:schemeClr>
+          </a:lnRef>
+          <a:fillRef idx="1">
+            <a:schemeClr val="accent1"/>
+          </a:fillRef>
+          <a:effectRef idx="0">
+            <a:schemeClr val="accent1"/>
+          </a:effectRef>
+          <a:fontRef idx="minor">
+            <a:schemeClr val="lt1"/>
+          </a:fontRef>
+        </p:style>
+        <p:txBody>
+          <a:bodyPr rtlCol="0" anchor="ctr"/>
+          <a:lstStyle/>
+          <a:p>
+            <a:pPr algn="ctr"/>
+            <a:r>
+              <a:rPr lang="en-CA" dirty="0" smtClean="0">
+                <a:solidFill>
+                  <a:schemeClr val="tx1"/>
+                </a:solidFill>
+              </a:rPr>
+              <a:t>G</a:t>
+            </a:r>
+            <a:endParaRPr lang="en-CA" dirty="0">
+              <a:solidFill>
+                <a:schemeClr val="tx1"/>
+              </a:solidFill>
+            </a:endParaRPr>
+          </a:p>
+        </p:txBody>
+      </p:sp>
+      <p:sp>
+        <p:nvSpPr>
+          <p:cNvPr id="8" name="Rectangle 7"/>
+          <p:cNvSpPr/>
+          <p:nvPr/>
+        </p:nvSpPr>
+        <p:spPr>
+          <a:xfrm>
+            <a:off x="7884368" y="2852936"/>
+            <a:ext cx="504056" cy="504056"/>
+          </a:xfrm>
+          <a:prstGeom prst="rect">
+            <a:avLst/>
+          </a:prstGeom>
+          <a:solidFill>
+            <a:schemeClr val="bg1"/>
+          </a:solidFill>
+          <a:ln w="15875">
+            <a:solidFill>
+              <a:schemeClr val="tx1"/>
+            </a:solidFill>
+          </a:ln>
+        </p:spPr>
+        <p:style>
+          <a:lnRef idx="2">
+            <a:schemeClr val="accent1">
+              <a:shade val="50000"/>
+            </a:schemeClr>
+          </a:lnRef>
+          <a:fillRef idx="1">
+            <a:schemeClr val="accent1"/>
+          </a:fillRef>
+          <a:effectRef idx="0">
+            <a:schemeClr val="accent1"/>
+          </a:effectRef>
+          <a:fontRef idx="minor">
+            <a:schemeClr val="lt1"/>
+          </a:fontRef>
+        </p:style>
+        <p:txBody>
+          <a:bodyPr rtlCol="0" anchor="ctr"/>
+          <a:lstStyle/>
+          <a:p>
+            <a:pPr algn="ctr"/>
+            <a:r>
+              <a:rPr lang="en-CA" dirty="0" smtClean="0">
+                <a:solidFill>
+                  <a:schemeClr val="tx1"/>
+                </a:solidFill>
+              </a:rPr>
+              <a:t>G</a:t>
+            </a:r>
+            <a:endParaRPr lang="en-CA" dirty="0">
+              <a:solidFill>
+                <a:schemeClr val="tx1"/>
+              </a:solidFill>
+            </a:endParaRPr>
+          </a:p>
+        </p:txBody>
+      </p:sp>
+      <p:sp>
+        <p:nvSpPr>
+          <p:cNvPr id="9" name="Oval 8"/>
+          <p:cNvSpPr/>
+          <p:nvPr/>
+        </p:nvSpPr>
+        <p:spPr>
+          <a:xfrm>
+            <a:off x="611560" y="5373216"/>
+            <a:ext cx="360040" cy="360040"/>
+          </a:xfrm>
+          <a:prstGeom prst="ellipse">
+            <a:avLst/>
+          </a:prstGeom>
+        </p:spPr>
+        <p:style>
+          <a:lnRef idx="2">
+            <a:schemeClr val="accent1">
+              <a:shade val="50000"/>
+            </a:schemeClr>
+          </a:lnRef>
+          <a:fillRef idx="1">
+            <a:schemeClr val="accent1"/>
+          </a:fillRef>
+          <a:effectRef idx="0">
+            <a:schemeClr val="accent1"/>
+          </a:effectRef>
+          <a:fontRef idx="minor">
+            <a:schemeClr val="lt1"/>
+          </a:fontRef>
+        </p:style>
+        <p:txBody>
+          <a:bodyPr rtlCol="0" anchor="ctr"/>
+          <a:lstStyle/>
+          <a:p>
+            <a:pPr algn="ctr"/>
+            <a:endParaRPr lang="en-CA"/>
+          </a:p>
+        </p:txBody>
+      </p:sp>
+      <p:sp>
+        <p:nvSpPr>
+          <p:cNvPr id="10" name="Oval 9"/>
+          <p:cNvSpPr/>
+          <p:nvPr/>
+        </p:nvSpPr>
+        <p:spPr>
+          <a:xfrm>
+            <a:off x="2051720" y="5373216"/>
+            <a:ext cx="360040" cy="360040"/>
+          </a:xfrm>
+          <a:prstGeom prst="ellipse">
+            <a:avLst/>
+          </a:prstGeom>
+        </p:spPr>
+        <p:style>
+          <a:lnRef idx="2">
+            <a:schemeClr val="accent1">
+              <a:shade val="50000"/>
+            </a:schemeClr>
+          </a:lnRef>
+          <a:fillRef idx="1">
+            <a:schemeClr val="accent1"/>
+          </a:fillRef>
+          <a:effectRef idx="0">
+            <a:schemeClr val="accent1"/>
+          </a:effectRef>
+          <a:fontRef idx="minor">
+            <a:schemeClr val="lt1"/>
+          </a:fontRef>
+        </p:style>
+        <p:txBody>
+          <a:bodyPr rtlCol="0" anchor="ctr"/>
+          <a:lstStyle/>
+          <a:p>
+            <a:pPr algn="ctr"/>
+            <a:endParaRPr lang="en-CA"/>
+          </a:p>
+        </p:txBody>
+      </p:sp>
+      <p:sp>
+        <p:nvSpPr>
+          <p:cNvPr id="11" name="Oval 10"/>
+          <p:cNvSpPr/>
+          <p:nvPr/>
+        </p:nvSpPr>
+        <p:spPr>
+          <a:xfrm>
+            <a:off x="3923928" y="5373216"/>
+            <a:ext cx="360040" cy="360040"/>
+          </a:xfrm>
+          <a:prstGeom prst="ellipse">
+            <a:avLst/>
+          </a:prstGeom>
+        </p:spPr>
+        <p:style>
+          <a:lnRef idx="2">
+            <a:schemeClr val="accent1">
+              <a:shade val="50000"/>
+            </a:schemeClr>
+          </a:lnRef>
+          <a:fillRef idx="1">
+            <a:schemeClr val="accent1"/>
+          </a:fillRef>
+          <a:effectRef idx="0">
+            <a:schemeClr val="accent1"/>
+          </a:effectRef>
+          <a:fontRef idx="minor">
+            <a:schemeClr val="lt1"/>
+          </a:fontRef>
+        </p:style>
+        <p:txBody>
+          <a:bodyPr rtlCol="0" anchor="ctr"/>
+          <a:lstStyle/>
+          <a:p>
+            <a:pPr algn="ctr"/>
+            <a:endParaRPr lang="en-CA"/>
+          </a:p>
+        </p:txBody>
+      </p:sp>
+      <p:sp>
+        <p:nvSpPr>
+          <p:cNvPr id="12" name="Oval 11"/>
+          <p:cNvSpPr/>
+          <p:nvPr/>
+        </p:nvSpPr>
+        <p:spPr>
+          <a:xfrm>
+            <a:off x="4716016" y="5345596"/>
+            <a:ext cx="360040" cy="360040"/>
+          </a:xfrm>
+          <a:prstGeom prst="ellipse">
+            <a:avLst/>
+          </a:prstGeom>
+        </p:spPr>
+        <p:style>
+          <a:lnRef idx="2">
+            <a:schemeClr val="accent1">
+              <a:shade val="50000"/>
+            </a:schemeClr>
+          </a:lnRef>
+          <a:fillRef idx="1">
+            <a:schemeClr val="accent1"/>
+          </a:fillRef>
+          <a:effectRef idx="0">
+            <a:schemeClr val="accent1"/>
+          </a:effectRef>
+          <a:fontRef idx="minor">
+            <a:schemeClr val="lt1"/>
+          </a:fontRef>
+        </p:style>
+        <p:txBody>
+          <a:bodyPr rtlCol="0" anchor="ctr"/>
+          <a:lstStyle/>
+          <a:p>
+            <a:pPr algn="ctr"/>
+            <a:endParaRPr lang="en-CA"/>
+          </a:p>
+        </p:txBody>
+      </p:sp>
+      <p:sp>
+        <p:nvSpPr>
+          <p:cNvPr id="13" name="Oval 12"/>
+          <p:cNvSpPr/>
+          <p:nvPr/>
+        </p:nvSpPr>
+        <p:spPr>
+          <a:xfrm>
+            <a:off x="5436096" y="5345596"/>
+            <a:ext cx="360040" cy="360040"/>
+          </a:xfrm>
+          <a:prstGeom prst="ellipse">
+            <a:avLst/>
+          </a:prstGeom>
+        </p:spPr>
+        <p:style>
+          <a:lnRef idx="2">
+            <a:schemeClr val="accent1">
+              <a:shade val="50000"/>
+            </a:schemeClr>
+          </a:lnRef>
+          <a:fillRef idx="1">
+            <a:schemeClr val="accent1"/>
+          </a:fillRef>
+          <a:effectRef idx="0">
+            <a:schemeClr val="accent1"/>
+          </a:effectRef>
+          <a:fontRef idx="minor">
+            <a:schemeClr val="lt1"/>
+          </a:fontRef>
+        </p:style>
+        <p:txBody>
+          <a:bodyPr rtlCol="0" anchor="ctr"/>
+          <a:lstStyle/>
+          <a:p>
+            <a:pPr algn="ctr"/>
+            <a:endParaRPr lang="en-CA"/>
+          </a:p>
+        </p:txBody>
+      </p:sp>
+      <p:sp>
+        <p:nvSpPr>
+          <p:cNvPr id="14" name="Oval 13"/>
+          <p:cNvSpPr/>
+          <p:nvPr/>
+        </p:nvSpPr>
+        <p:spPr>
+          <a:xfrm>
+            <a:off x="7956376" y="5373216"/>
+            <a:ext cx="360040" cy="360040"/>
+          </a:xfrm>
+          <a:prstGeom prst="ellipse">
+            <a:avLst/>
+          </a:prstGeom>
+        </p:spPr>
+        <p:style>
+          <a:lnRef idx="2">
+            <a:schemeClr val="accent1">
+              <a:shade val="50000"/>
+            </a:schemeClr>
+          </a:lnRef>
+          <a:fillRef idx="1">
+            <a:schemeClr val="accent1"/>
+          </a:fillRef>
+          <a:effectRef idx="0">
+            <a:schemeClr val="accent1"/>
+          </a:effectRef>
+          <a:fontRef idx="minor">
+            <a:schemeClr val="lt1"/>
+          </a:fontRef>
+        </p:style>
+        <p:txBody>
+          <a:bodyPr rtlCol="0" anchor="ctr"/>
+          <a:lstStyle/>
+          <a:p>
+            <a:pPr algn="ctr"/>
+            <a:endParaRPr lang="en-CA"/>
+          </a:p>
+        </p:txBody>
+      </p:sp>
+      <p:cxnSp>
+        <p:nvCxnSpPr>
+          <p:cNvPr id="16" name="Straight Arrow Connector 15"/>
+          <p:cNvCxnSpPr>
+            <a:stCxn id="6" idx="2"/>
+            <a:endCxn id="9" idx="0"/>
+          </p:cNvCxnSpPr>
+          <p:nvPr/>
+        </p:nvCxnSpPr>
+        <p:spPr>
+          <a:xfrm flipH="1">
+            <a:off x="791580" y="3356992"/>
+            <a:ext cx="720080" cy="2016224"/>
+          </a:xfrm>
+          <a:prstGeom prst="straightConnector1">
+            <a:avLst/>
+          </a:prstGeom>
+          <a:ln w="38100">
+            <a:tailEnd type="arrow"/>
+          </a:ln>
+        </p:spPr>
+        <p:style>
+          <a:lnRef idx="1">
+            <a:schemeClr val="accent5"/>
+          </a:lnRef>
+          <a:fillRef idx="0">
+            <a:schemeClr val="accent5"/>
+          </a:fillRef>
+          <a:effectRef idx="0">
+            <a:schemeClr val="accent5"/>
+          </a:effectRef>
+          <a:fontRef idx="minor">
+            <a:schemeClr val="tx1"/>
+          </a:fontRef>
+        </p:style>
+      </p:cxnSp>
+      <p:cxnSp>
+        <p:nvCxnSpPr>
+          <p:cNvPr id="18" name="Straight Arrow Connector 17"/>
+          <p:cNvCxnSpPr>
+            <a:stCxn id="6" idx="2"/>
+            <a:endCxn id="10" idx="0"/>
+          </p:cNvCxnSpPr>
+          <p:nvPr/>
+        </p:nvCxnSpPr>
+        <p:spPr>
+          <a:xfrm>
+            <a:off x="1511660" y="3356992"/>
+            <a:ext cx="720080" cy="2016224"/>
+          </a:xfrm>
+          <a:prstGeom prst="straightConnector1">
+            <a:avLst/>
+          </a:prstGeom>
+          <a:ln w="38100">
+            <a:tailEnd type="arrow"/>
+          </a:ln>
+        </p:spPr>
+        <p:style>
+          <a:lnRef idx="1">
+            <a:schemeClr val="accent5"/>
+          </a:lnRef>
+          <a:fillRef idx="0">
+            <a:schemeClr val="accent5"/>
+          </a:fillRef>
+          <a:effectRef idx="0">
+            <a:schemeClr val="accent5"/>
+          </a:effectRef>
+          <a:fontRef idx="minor">
+            <a:schemeClr val="tx1"/>
+          </a:fontRef>
+        </p:style>
+      </p:cxnSp>
+      <p:cxnSp>
+        <p:nvCxnSpPr>
+          <p:cNvPr id="21" name="Straight Arrow Connector 20"/>
+          <p:cNvCxnSpPr>
+            <a:stCxn id="7" idx="2"/>
+            <a:endCxn id="11" idx="0"/>
+          </p:cNvCxnSpPr>
+          <p:nvPr/>
+        </p:nvCxnSpPr>
+        <p:spPr>
+          <a:xfrm flipH="1">
+            <a:off x="4103948" y="3356992"/>
+            <a:ext cx="720080" cy="2016224"/>
+          </a:xfrm>
+          <a:prstGeom prst="straightConnector1">
+            <a:avLst/>
+          </a:prstGeom>
+          <a:ln w="38100">
+            <a:tailEnd type="arrow"/>
+          </a:ln>
+        </p:spPr>
+        <p:style>
+          <a:lnRef idx="1">
+            <a:schemeClr val="accent5"/>
+          </a:lnRef>
+          <a:fillRef idx="0">
+            <a:schemeClr val="accent5"/>
+          </a:fillRef>
+          <a:effectRef idx="0">
+            <a:schemeClr val="accent5"/>
+          </a:effectRef>
+          <a:fontRef idx="minor">
+            <a:schemeClr val="tx1"/>
+          </a:fontRef>
+        </p:style>
+      </p:cxnSp>
+      <p:cxnSp>
+        <p:nvCxnSpPr>
+          <p:cNvPr id="24" name="Straight Arrow Connector 23"/>
+          <p:cNvCxnSpPr>
+            <a:stCxn id="7" idx="2"/>
+            <a:endCxn id="12" idx="0"/>
+          </p:cNvCxnSpPr>
+          <p:nvPr/>
+        </p:nvCxnSpPr>
+        <p:spPr>
+          <a:xfrm>
+            <a:off x="4824028" y="3356992"/>
+            <a:ext cx="72008" cy="1988604"/>
+          </a:xfrm>
+          <a:prstGeom prst="straightConnector1">
+            <a:avLst/>
+          </a:prstGeom>
+          <a:ln w="38100">
+            <a:tailEnd type="arrow"/>
+          </a:ln>
+        </p:spPr>
+        <p:style>
+          <a:lnRef idx="1">
+            <a:schemeClr val="accent5"/>
+          </a:lnRef>
+          <a:fillRef idx="0">
+            <a:schemeClr val="accent5"/>
+          </a:fillRef>
+          <a:effectRef idx="0">
+            <a:schemeClr val="accent5"/>
+          </a:effectRef>
+          <a:fontRef idx="minor">
+            <a:schemeClr val="tx1"/>
+          </a:fontRef>
+        </p:style>
+      </p:cxnSp>
+      <p:cxnSp>
+        <p:nvCxnSpPr>
+          <p:cNvPr id="27" name="Straight Arrow Connector 26"/>
+          <p:cNvCxnSpPr>
+            <a:stCxn id="7" idx="2"/>
+            <a:endCxn id="13" idx="0"/>
+          </p:cNvCxnSpPr>
+          <p:nvPr/>
+        </p:nvCxnSpPr>
+        <p:spPr>
+          <a:xfrm>
+            <a:off x="4824028" y="3356992"/>
+            <a:ext cx="792088" cy="1988604"/>
+          </a:xfrm>
+          <a:prstGeom prst="straightConnector1">
+            <a:avLst/>
+          </a:prstGeom>
+          <a:ln w="38100">
+            <a:tailEnd type="arrow"/>
+          </a:ln>
+        </p:spPr>
+        <p:style>
+          <a:lnRef idx="1">
+            <a:schemeClr val="accent5"/>
+          </a:lnRef>
+          <a:fillRef idx="0">
+            <a:schemeClr val="accent5"/>
+          </a:fillRef>
+          <a:effectRef idx="0">
+            <a:schemeClr val="accent5"/>
+          </a:effectRef>
+          <a:fontRef idx="minor">
+            <a:schemeClr val="tx1"/>
+          </a:fontRef>
+        </p:style>
+      </p:cxnSp>
+      <p:cxnSp>
+        <p:nvCxnSpPr>
+          <p:cNvPr id="30" name="Straight Arrow Connector 29"/>
+          <p:cNvCxnSpPr>
+            <a:stCxn id="8" idx="2"/>
+            <a:endCxn id="14" idx="0"/>
+          </p:cNvCxnSpPr>
+          <p:nvPr/>
+        </p:nvCxnSpPr>
+        <p:spPr>
+          <a:xfrm>
+            <a:off x="8136396" y="3356992"/>
+            <a:ext cx="0" cy="2016224"/>
+          </a:xfrm>
+          <a:prstGeom prst="straightConnector1">
+            <a:avLst/>
+          </a:prstGeom>
+          <a:ln w="38100">
+            <a:tailEnd type="arrow"/>
+          </a:ln>
+        </p:spPr>
+        <p:style>
+          <a:lnRef idx="1">
+            <a:schemeClr val="accent5"/>
+          </a:lnRef>
+          <a:fillRef idx="0">
+            <a:schemeClr val="accent5"/>
+          </a:fillRef>
+          <a:effectRef idx="0">
+            <a:schemeClr val="accent5"/>
+          </a:effectRef>
+          <a:fontRef idx="minor">
+            <a:schemeClr val="tx1"/>
+          </a:fontRef>
+        </p:style>
+      </p:cxnSp>
+      <p:cxnSp>
+        <p:nvCxnSpPr>
+          <p:cNvPr id="33" name="Straight Arrow Connector 32"/>
+          <p:cNvCxnSpPr>
+            <a:stCxn id="4" idx="2"/>
+            <a:endCxn id="6" idx="0"/>
+          </p:cNvCxnSpPr>
+          <p:nvPr/>
+        </p:nvCxnSpPr>
+        <p:spPr>
+          <a:xfrm flipH="1">
+            <a:off x="1511660" y="980728"/>
+            <a:ext cx="3312368" cy="1872208"/>
+          </a:xfrm>
+          <a:prstGeom prst="straightConnector1">
+            <a:avLst/>
+          </a:prstGeom>
+          <a:ln w="38100">
+            <a:solidFill>
+              <a:schemeClr val="accent2">
+                <a:lumMod val="75000"/>
+              </a:schemeClr>
+            </a:solidFill>
+            <a:tailEnd type="arrow"/>
+          </a:ln>
+        </p:spPr>
+        <p:style>
+          <a:lnRef idx="1">
+            <a:schemeClr val="accent2"/>
+          </a:lnRef>
+          <a:fillRef idx="0">
+            <a:schemeClr val="accent2"/>
+          </a:fillRef>
+          <a:effectRef idx="0">
+            <a:schemeClr val="accent2"/>
+          </a:effectRef>
+          <a:fontRef idx="minor">
+            <a:schemeClr val="tx1"/>
+          </a:fontRef>
+        </p:style>
+      </p:cxnSp>
+      <p:cxnSp>
+        <p:nvCxnSpPr>
+          <p:cNvPr id="36" name="Straight Arrow Connector 35"/>
+          <p:cNvCxnSpPr>
+            <a:stCxn id="4" idx="2"/>
+            <a:endCxn id="7" idx="0"/>
+          </p:cNvCxnSpPr>
+          <p:nvPr/>
+        </p:nvCxnSpPr>
+        <p:spPr>
+          <a:xfrm>
+            <a:off x="4824028" y="980728"/>
+            <a:ext cx="0" cy="1872208"/>
+          </a:xfrm>
+          <a:prstGeom prst="straightConnector1">
+            <a:avLst/>
+          </a:prstGeom>
+          <a:ln w="38100">
+            <a:solidFill>
+              <a:schemeClr val="accent2">
+                <a:lumMod val="75000"/>
+              </a:schemeClr>
+            </a:solidFill>
+            <a:tailEnd type="arrow"/>
+          </a:ln>
+        </p:spPr>
+        <p:style>
+          <a:lnRef idx="1">
+            <a:schemeClr val="accent2"/>
+          </a:lnRef>
+          <a:fillRef idx="0">
+            <a:schemeClr val="accent2"/>
+          </a:fillRef>
+          <a:effectRef idx="0">
+            <a:schemeClr val="accent2"/>
+          </a:effectRef>
+          <a:fontRef idx="minor">
+            <a:schemeClr val="tx1"/>
+          </a:fontRef>
+        </p:style>
+      </p:cxnSp>
+      <p:cxnSp>
+        <p:nvCxnSpPr>
+          <p:cNvPr id="39" name="Straight Arrow Connector 38"/>
+          <p:cNvCxnSpPr>
+            <a:stCxn id="4" idx="2"/>
+            <a:endCxn id="8" idx="0"/>
+          </p:cNvCxnSpPr>
+          <p:nvPr/>
+        </p:nvCxnSpPr>
+        <p:spPr>
+          <a:xfrm>
+            <a:off x="4824028" y="980728"/>
+            <a:ext cx="3312368" cy="1872208"/>
+          </a:xfrm>
+          <a:prstGeom prst="straightConnector1">
+            <a:avLst/>
+          </a:prstGeom>
+          <a:ln w="38100">
+            <a:solidFill>
+              <a:schemeClr val="accent2">
+                <a:lumMod val="75000"/>
+              </a:schemeClr>
+            </a:solidFill>
+            <a:tailEnd type="arrow"/>
+          </a:ln>
+        </p:spPr>
+        <p:style>
+          <a:lnRef idx="1">
+            <a:schemeClr val="accent2"/>
+          </a:lnRef>
+          <a:fillRef idx="0">
+            <a:schemeClr val="accent2"/>
+          </a:fillRef>
+          <a:effectRef idx="0">
+            <a:schemeClr val="accent2"/>
+          </a:effectRef>
+          <a:fontRef idx="minor">
+            <a:schemeClr val="tx1"/>
+          </a:fontRef>
+        </p:style>
+      </p:cxnSp>
+    </p:spTree>
+    <p:extLst>
+      <p:ext uri="{BB962C8B-B14F-4D97-AF65-F5344CB8AC3E}">
+        <p14:creationId xmlns:p14="http://schemas.microsoft.com/office/powerpoint/2010/main" val="494261964"/>
       </p:ext>
     </p:extLst>
   </p:cSld>

</xml_diff>